<commit_message>
Added more exercises, small adaptations to presentation
</commit_message>
<xml_diff>
--- a/workshop-java8.pptx
+++ b/workshop-java8.pptx
@@ -240,7 +240,7 @@
           <a:p>
             <a:fld id="{B3F5A23E-8457-422A-9AD6-1801CAF2A741}" type="datetimeFigureOut">
               <a:rPr lang="fr-BE" smtClean="0"/>
-              <a:t>27/06/2014</a:t>
+              <a:t>29/08/2014</a:t>
             </a:fld>
             <a:endParaRPr lang="fr-BE"/>
           </a:p>
@@ -991,7 +991,7 @@
         <p:nvSpPr>
           <p:cNvPr id="86017" name="Rectangle 1"/>
           <p:cNvSpPr txBox="1">
-            <a:spLocks noChangeArrowheads="1"/>
+            <a:spLocks noGrp="1" noRot="1" noChangeAspect="1" noChangeArrowheads="1"/>
           </p:cNvSpPr>
           <p:nvPr>
             <p:ph type="sldImg"/>
@@ -1033,7 +1033,7 @@
         <p:nvSpPr>
           <p:cNvPr id="86018" name="Rectangle 2"/>
           <p:cNvSpPr txBox="1">
-            <a:spLocks noChangeArrowheads="1"/>
+            <a:spLocks noGrp="1" noChangeArrowheads="1"/>
           </p:cNvSpPr>
           <p:nvPr>
             <p:ph type="body" idx="1"/>
@@ -1149,7 +1149,7 @@
         <p:nvSpPr>
           <p:cNvPr id="84993" name="Rectangle 1"/>
           <p:cNvSpPr txBox="1">
-            <a:spLocks noChangeArrowheads="1"/>
+            <a:spLocks noGrp="1" noRot="1" noChangeAspect="1" noChangeArrowheads="1"/>
           </p:cNvSpPr>
           <p:nvPr>
             <p:ph type="sldImg"/>
@@ -1191,7 +1191,7 @@
         <p:nvSpPr>
           <p:cNvPr id="84994" name="Rectangle 2"/>
           <p:cNvSpPr txBox="1">
-            <a:spLocks noChangeArrowheads="1"/>
+            <a:spLocks noGrp="1" noChangeArrowheads="1"/>
           </p:cNvSpPr>
           <p:nvPr>
             <p:ph type="body" idx="1"/>
@@ -1307,7 +1307,7 @@
         <p:nvSpPr>
           <p:cNvPr id="84993" name="Rectangle 1"/>
           <p:cNvSpPr txBox="1">
-            <a:spLocks noChangeArrowheads="1"/>
+            <a:spLocks noGrp="1" noRot="1" noChangeAspect="1" noChangeArrowheads="1"/>
           </p:cNvSpPr>
           <p:nvPr>
             <p:ph type="sldImg"/>
@@ -1349,7 +1349,7 @@
         <p:nvSpPr>
           <p:cNvPr id="84994" name="Rectangle 2"/>
           <p:cNvSpPr txBox="1">
-            <a:spLocks noChangeArrowheads="1"/>
+            <a:spLocks noGrp="1" noChangeArrowheads="1"/>
           </p:cNvSpPr>
           <p:nvPr>
             <p:ph type="body" idx="1"/>
@@ -1465,7 +1465,7 @@
         <p:nvSpPr>
           <p:cNvPr id="84993" name="Rectangle 1"/>
           <p:cNvSpPr txBox="1">
-            <a:spLocks noChangeArrowheads="1"/>
+            <a:spLocks noGrp="1" noRot="1" noChangeAspect="1" noChangeArrowheads="1"/>
           </p:cNvSpPr>
           <p:nvPr>
             <p:ph type="sldImg"/>
@@ -1507,7 +1507,7 @@
         <p:nvSpPr>
           <p:cNvPr id="84994" name="Rectangle 2"/>
           <p:cNvSpPr txBox="1">
-            <a:spLocks noChangeArrowheads="1"/>
+            <a:spLocks noGrp="1" noChangeArrowheads="1"/>
           </p:cNvSpPr>
           <p:nvPr>
             <p:ph type="body" idx="1"/>
@@ -1623,7 +1623,7 @@
         <p:nvSpPr>
           <p:cNvPr id="82945" name="Rectangle 1"/>
           <p:cNvSpPr txBox="1">
-            <a:spLocks noChangeArrowheads="1"/>
+            <a:spLocks noGrp="1" noRot="1" noChangeAspect="1" noChangeArrowheads="1"/>
           </p:cNvSpPr>
           <p:nvPr>
             <p:ph type="sldImg"/>
@@ -1665,7 +1665,7 @@
         <p:nvSpPr>
           <p:cNvPr id="82946" name="Rectangle 2"/>
           <p:cNvSpPr txBox="1">
-            <a:spLocks noChangeArrowheads="1"/>
+            <a:spLocks noGrp="1" noChangeArrowheads="1"/>
           </p:cNvSpPr>
           <p:nvPr>
             <p:ph type="body" idx="1"/>
@@ -1781,7 +1781,7 @@
         <p:nvSpPr>
           <p:cNvPr id="82945" name="Rectangle 1"/>
           <p:cNvSpPr txBox="1">
-            <a:spLocks noChangeArrowheads="1"/>
+            <a:spLocks noGrp="1" noRot="1" noChangeAspect="1" noChangeArrowheads="1"/>
           </p:cNvSpPr>
           <p:nvPr>
             <p:ph type="sldImg"/>
@@ -1823,7 +1823,7 @@
         <p:nvSpPr>
           <p:cNvPr id="82946" name="Rectangle 2"/>
           <p:cNvSpPr txBox="1">
-            <a:spLocks noChangeArrowheads="1"/>
+            <a:spLocks noGrp="1" noChangeArrowheads="1"/>
           </p:cNvSpPr>
           <p:nvPr>
             <p:ph type="body" idx="1"/>
@@ -1939,7 +1939,7 @@
         <p:nvSpPr>
           <p:cNvPr id="83969" name="Rectangle 1"/>
           <p:cNvSpPr txBox="1">
-            <a:spLocks noChangeArrowheads="1"/>
+            <a:spLocks noGrp="1" noRot="1" noChangeAspect="1" noChangeArrowheads="1"/>
           </p:cNvSpPr>
           <p:nvPr>
             <p:ph type="sldImg"/>
@@ -1981,7 +1981,7 @@
         <p:nvSpPr>
           <p:cNvPr id="83970" name="Rectangle 2"/>
           <p:cNvSpPr txBox="1">
-            <a:spLocks noChangeArrowheads="1"/>
+            <a:spLocks noGrp="1" noChangeArrowheads="1"/>
           </p:cNvSpPr>
           <p:nvPr>
             <p:ph type="body" idx="1"/>
@@ -2221,7 +2221,7 @@
         <p:nvSpPr>
           <p:cNvPr id="77825" name="Rectangle 1"/>
           <p:cNvSpPr txBox="1">
-            <a:spLocks noChangeArrowheads="1"/>
+            <a:spLocks noGrp="1" noRot="1" noChangeAspect="1" noChangeArrowheads="1"/>
           </p:cNvSpPr>
           <p:nvPr>
             <p:ph type="sldImg"/>
@@ -2263,7 +2263,7 @@
         <p:nvSpPr>
           <p:cNvPr id="77826" name="Rectangle 2"/>
           <p:cNvSpPr txBox="1">
-            <a:spLocks noChangeArrowheads="1"/>
+            <a:spLocks noGrp="1" noChangeArrowheads="1"/>
           </p:cNvSpPr>
           <p:nvPr>
             <p:ph type="body" idx="1"/>
@@ -2379,7 +2379,7 @@
         <p:nvSpPr>
           <p:cNvPr id="78849" name="Rectangle 1"/>
           <p:cNvSpPr txBox="1">
-            <a:spLocks noChangeArrowheads="1"/>
+            <a:spLocks noGrp="1" noRot="1" noChangeAspect="1" noChangeArrowheads="1"/>
           </p:cNvSpPr>
           <p:nvPr>
             <p:ph type="sldImg"/>
@@ -2421,7 +2421,7 @@
         <p:nvSpPr>
           <p:cNvPr id="78850" name="Rectangle 2"/>
           <p:cNvSpPr txBox="1">
-            <a:spLocks noChangeArrowheads="1"/>
+            <a:spLocks noGrp="1" noChangeArrowheads="1"/>
           </p:cNvSpPr>
           <p:nvPr>
             <p:ph type="body" idx="1"/>
@@ -2537,7 +2537,7 @@
         <p:nvSpPr>
           <p:cNvPr id="81921" name="Rectangle 1"/>
           <p:cNvSpPr txBox="1">
-            <a:spLocks noChangeArrowheads="1"/>
+            <a:spLocks noGrp="1" noRot="1" noChangeAspect="1" noChangeArrowheads="1"/>
           </p:cNvSpPr>
           <p:nvPr>
             <p:ph type="sldImg"/>
@@ -2579,7 +2579,7 @@
         <p:nvSpPr>
           <p:cNvPr id="81922" name="Rectangle 2"/>
           <p:cNvSpPr txBox="1">
-            <a:spLocks noChangeArrowheads="1"/>
+            <a:spLocks noGrp="1" noChangeArrowheads="1"/>
           </p:cNvSpPr>
           <p:nvPr>
             <p:ph type="body" idx="1"/>
@@ -2695,7 +2695,7 @@
         <p:nvSpPr>
           <p:cNvPr id="79873" name="Rectangle 1"/>
           <p:cNvSpPr txBox="1">
-            <a:spLocks noChangeArrowheads="1"/>
+            <a:spLocks noGrp="1" noRot="1" noChangeAspect="1" noChangeArrowheads="1"/>
           </p:cNvSpPr>
           <p:nvPr>
             <p:ph type="sldImg"/>
@@ -2737,7 +2737,7 @@
         <p:nvSpPr>
           <p:cNvPr id="79874" name="Rectangle 2"/>
           <p:cNvSpPr txBox="1">
-            <a:spLocks noChangeArrowheads="1"/>
+            <a:spLocks noGrp="1" noChangeArrowheads="1"/>
           </p:cNvSpPr>
           <p:nvPr>
             <p:ph type="body" idx="1"/>
@@ -2853,7 +2853,7 @@
         <p:nvSpPr>
           <p:cNvPr id="80897" name="Rectangle 1"/>
           <p:cNvSpPr txBox="1">
-            <a:spLocks noChangeArrowheads="1"/>
+            <a:spLocks noGrp="1" noRot="1" noChangeAspect="1" noChangeArrowheads="1"/>
           </p:cNvSpPr>
           <p:nvPr>
             <p:ph type="sldImg"/>
@@ -2895,7 +2895,7 @@
         <p:nvSpPr>
           <p:cNvPr id="80898" name="Rectangle 2"/>
           <p:cNvSpPr txBox="1">
-            <a:spLocks noChangeArrowheads="1"/>
+            <a:spLocks noGrp="1" noChangeArrowheads="1"/>
           </p:cNvSpPr>
           <p:nvPr>
             <p:ph type="body" idx="1"/>
@@ -3011,7 +3011,7 @@
         <p:nvSpPr>
           <p:cNvPr id="82945" name="Rectangle 1"/>
           <p:cNvSpPr txBox="1">
-            <a:spLocks noChangeArrowheads="1"/>
+            <a:spLocks noGrp="1" noRot="1" noChangeAspect="1" noChangeArrowheads="1"/>
           </p:cNvSpPr>
           <p:nvPr>
             <p:ph type="sldImg"/>
@@ -3053,7 +3053,7 @@
         <p:nvSpPr>
           <p:cNvPr id="82946" name="Rectangle 2"/>
           <p:cNvSpPr txBox="1">
-            <a:spLocks noChangeArrowheads="1"/>
+            <a:spLocks noGrp="1" noChangeArrowheads="1"/>
           </p:cNvSpPr>
           <p:nvPr>
             <p:ph type="body" idx="1"/>
@@ -3169,7 +3169,7 @@
         <p:nvSpPr>
           <p:cNvPr id="83969" name="Rectangle 1"/>
           <p:cNvSpPr txBox="1">
-            <a:spLocks noChangeArrowheads="1"/>
+            <a:spLocks noGrp="1" noRot="1" noChangeAspect="1" noChangeArrowheads="1"/>
           </p:cNvSpPr>
           <p:nvPr>
             <p:ph type="sldImg"/>
@@ -3211,7 +3211,7 @@
         <p:nvSpPr>
           <p:cNvPr id="83970" name="Rectangle 2"/>
           <p:cNvSpPr txBox="1">
-            <a:spLocks noChangeArrowheads="1"/>
+            <a:spLocks noGrp="1" noChangeArrowheads="1"/>
           </p:cNvSpPr>
           <p:nvPr>
             <p:ph type="body" idx="1"/>
@@ -3327,7 +3327,7 @@
         <p:nvSpPr>
           <p:cNvPr id="84993" name="Rectangle 1"/>
           <p:cNvSpPr txBox="1">
-            <a:spLocks noChangeArrowheads="1"/>
+            <a:spLocks noGrp="1" noRot="1" noChangeAspect="1" noChangeArrowheads="1"/>
           </p:cNvSpPr>
           <p:nvPr>
             <p:ph type="sldImg"/>
@@ -3369,7 +3369,7 @@
         <p:nvSpPr>
           <p:cNvPr id="84994" name="Rectangle 2"/>
           <p:cNvSpPr txBox="1">
-            <a:spLocks noChangeArrowheads="1"/>
+            <a:spLocks noGrp="1" noChangeArrowheads="1"/>
           </p:cNvSpPr>
           <p:nvPr>
             <p:ph type="body" idx="1"/>
@@ -3611,7 +3611,7 @@
           <a:p>
             <a:fld id="{AA309A6D-C09C-4548-B29A-6CF363A7E532}" type="datetimeFigureOut">
               <a:rPr lang="fr-FR" smtClean="0"/>
-              <a:t>27/06/2014</a:t>
+              <a:t>29/08/2014</a:t>
             </a:fld>
             <a:endParaRPr lang="fr-BE"/>
           </a:p>
@@ -3776,7 +3776,7 @@
           <a:p>
             <a:fld id="{AA309A6D-C09C-4548-B29A-6CF363A7E532}" type="datetimeFigureOut">
               <a:rPr lang="fr-FR" smtClean="0"/>
-              <a:t>27/06/2014</a:t>
+              <a:t>29/08/2014</a:t>
             </a:fld>
             <a:endParaRPr lang="fr-BE"/>
           </a:p>
@@ -3951,7 +3951,7 @@
           <a:p>
             <a:fld id="{AA309A6D-C09C-4548-B29A-6CF363A7E532}" type="datetimeFigureOut">
               <a:rPr lang="fr-FR" smtClean="0"/>
-              <a:t>27/06/2014</a:t>
+              <a:t>29/08/2014</a:t>
             </a:fld>
             <a:endParaRPr lang="fr-BE"/>
           </a:p>
@@ -4116,7 +4116,7 @@
           <a:p>
             <a:fld id="{AA309A6D-C09C-4548-B29A-6CF363A7E532}" type="datetimeFigureOut">
               <a:rPr lang="fr-FR" smtClean="0"/>
-              <a:t>27/06/2014</a:t>
+              <a:t>29/08/2014</a:t>
             </a:fld>
             <a:endParaRPr lang="fr-BE"/>
           </a:p>
@@ -4357,7 +4357,7 @@
           <a:p>
             <a:fld id="{AA309A6D-C09C-4548-B29A-6CF363A7E532}" type="datetimeFigureOut">
               <a:rPr lang="fr-FR" smtClean="0"/>
-              <a:t>27/06/2014</a:t>
+              <a:t>29/08/2014</a:t>
             </a:fld>
             <a:endParaRPr lang="fr-BE"/>
           </a:p>
@@ -4640,7 +4640,7 @@
           <a:p>
             <a:fld id="{AA309A6D-C09C-4548-B29A-6CF363A7E532}" type="datetimeFigureOut">
               <a:rPr lang="fr-FR" smtClean="0"/>
-              <a:t>27/06/2014</a:t>
+              <a:t>29/08/2014</a:t>
             </a:fld>
             <a:endParaRPr lang="fr-BE"/>
           </a:p>
@@ -5057,7 +5057,7 @@
           <a:p>
             <a:fld id="{AA309A6D-C09C-4548-B29A-6CF363A7E532}" type="datetimeFigureOut">
               <a:rPr lang="fr-FR" smtClean="0"/>
-              <a:t>27/06/2014</a:t>
+              <a:t>29/08/2014</a:t>
             </a:fld>
             <a:endParaRPr lang="fr-BE"/>
           </a:p>
@@ -5170,7 +5170,7 @@
           <a:p>
             <a:fld id="{AA309A6D-C09C-4548-B29A-6CF363A7E532}" type="datetimeFigureOut">
               <a:rPr lang="fr-FR" smtClean="0"/>
-              <a:t>27/06/2014</a:t>
+              <a:t>29/08/2014</a:t>
             </a:fld>
             <a:endParaRPr lang="fr-BE"/>
           </a:p>
@@ -5260,7 +5260,7 @@
           <a:p>
             <a:fld id="{AA309A6D-C09C-4548-B29A-6CF363A7E532}" type="datetimeFigureOut">
               <a:rPr lang="fr-FR" smtClean="0"/>
-              <a:t>27/06/2014</a:t>
+              <a:t>29/08/2014</a:t>
             </a:fld>
             <a:endParaRPr lang="fr-BE"/>
           </a:p>
@@ -5532,7 +5532,7 @@
           <a:p>
             <a:fld id="{AA309A6D-C09C-4548-B29A-6CF363A7E532}" type="datetimeFigureOut">
               <a:rPr lang="fr-FR" smtClean="0"/>
-              <a:t>27/06/2014</a:t>
+              <a:t>29/08/2014</a:t>
             </a:fld>
             <a:endParaRPr lang="fr-BE"/>
           </a:p>
@@ -5780,7 +5780,7 @@
           <a:p>
             <a:fld id="{AA309A6D-C09C-4548-B29A-6CF363A7E532}" type="datetimeFigureOut">
               <a:rPr lang="fr-FR" smtClean="0"/>
-              <a:t>27/06/2014</a:t>
+              <a:t>29/08/2014</a:t>
             </a:fld>
             <a:endParaRPr lang="fr-BE"/>
           </a:p>
@@ -5988,7 +5988,7 @@
           <a:p>
             <a:fld id="{AA309A6D-C09C-4548-B29A-6CF363A7E532}" type="datetimeFigureOut">
               <a:rPr lang="fr-FR" smtClean="0"/>
-              <a:t>27/06/2014</a:t>
+              <a:t>29/08/2014</a:t>
             </a:fld>
             <a:endParaRPr lang="fr-BE"/>
           </a:p>
@@ -11559,6 +11559,50 @@
           </a:p>
         </p:txBody>
       </p:sp>
+      <p:sp>
+        <p:nvSpPr>
+          <p:cNvPr id="4" name="Ellipse 3"/>
+          <p:cNvSpPr/>
+          <p:nvPr/>
+        </p:nvSpPr>
+        <p:spPr>
+          <a:xfrm>
+            <a:off x="8028384" y="1268760"/>
+            <a:ext cx="504056" cy="504056"/>
+          </a:xfrm>
+          <a:prstGeom prst="ellipse">
+            <a:avLst/>
+          </a:prstGeom>
+        </p:spPr>
+        <p:style>
+          <a:lnRef idx="2">
+            <a:schemeClr val="accent5">
+              <a:shade val="50000"/>
+            </a:schemeClr>
+          </a:lnRef>
+          <a:fillRef idx="1">
+            <a:schemeClr val="accent5"/>
+          </a:fillRef>
+          <a:effectRef idx="0">
+            <a:schemeClr val="accent5"/>
+          </a:effectRef>
+          <a:fontRef idx="minor">
+            <a:schemeClr val="lt1"/>
+          </a:fontRef>
+        </p:style>
+        <p:txBody>
+          <a:bodyPr rtlCol="0" anchor="ctr"/>
+          <a:lstStyle/>
+          <a:p>
+            <a:pPr algn="ctr"/>
+            <a:r>
+              <a:rPr lang="fr-BE" sz="2800" b="1" dirty="0" smtClean="0"/>
+              <a:t>1</a:t>
+            </a:r>
+            <a:endParaRPr lang="fr-BE" sz="2800" b="1" dirty="0"/>
+          </a:p>
+        </p:txBody>
+      </p:sp>
     </p:spTree>
     <p:extLst>
       <p:ext uri="{BB962C8B-B14F-4D97-AF65-F5344CB8AC3E}">
@@ -14010,6 +14054,50 @@
           </a:p>
         </p:txBody>
       </p:sp>
+      <p:sp>
+        <p:nvSpPr>
+          <p:cNvPr id="4" name="Ellipse 3"/>
+          <p:cNvSpPr/>
+          <p:nvPr/>
+        </p:nvSpPr>
+        <p:spPr>
+          <a:xfrm>
+            <a:off x="8028384" y="1268760"/>
+            <a:ext cx="504056" cy="504056"/>
+          </a:xfrm>
+          <a:prstGeom prst="ellipse">
+            <a:avLst/>
+          </a:prstGeom>
+        </p:spPr>
+        <p:style>
+          <a:lnRef idx="2">
+            <a:schemeClr val="accent5">
+              <a:shade val="50000"/>
+            </a:schemeClr>
+          </a:lnRef>
+          <a:fillRef idx="1">
+            <a:schemeClr val="accent5"/>
+          </a:fillRef>
+          <a:effectRef idx="0">
+            <a:schemeClr val="accent5"/>
+          </a:effectRef>
+          <a:fontRef idx="minor">
+            <a:schemeClr val="lt1"/>
+          </a:fontRef>
+        </p:style>
+        <p:txBody>
+          <a:bodyPr rtlCol="0" anchor="ctr"/>
+          <a:lstStyle/>
+          <a:p>
+            <a:pPr algn="ctr"/>
+            <a:r>
+              <a:rPr lang="fr-BE" sz="2800" b="1" dirty="0" smtClean="0"/>
+              <a:t>2</a:t>
+            </a:r>
+            <a:endParaRPr lang="fr-BE" sz="2800" b="1" dirty="0"/>
+          </a:p>
+        </p:txBody>
+      </p:sp>
     </p:spTree>
     <p:extLst>
       <p:ext uri="{BB962C8B-B14F-4D97-AF65-F5344CB8AC3E}">
@@ -17788,7 +17876,7 @@
   <p:timing>
     <p:tnLst>
       <p:par>
-        <p:cTn id="1" dur="indefinite" nodeType="tmRoot">
+        <p:cTn id="1" dur="indefinite" restart="never" nodeType="tmRoot">
           <p:childTnLst>
             <p:seq concurrent="1" nextAc="seek">
               <p:cTn id="2" dur="0" nodeType="mainSeq"/>
@@ -21691,7 +21779,7 @@
   <p:timing>
     <p:tnLst>
       <p:par>
-        <p:cTn id="1" dur="indefinite" nodeType="tmRoot">
+        <p:cTn id="1" dur="indefinite" restart="never" nodeType="tmRoot">
           <p:childTnLst>
             <p:seq concurrent="1" nextAc="seek">
               <p:cTn id="2" dur="0" nodeType="mainSeq"/>
@@ -23339,7 +23427,7 @@
   <p:timing>
     <p:tnLst>
       <p:par>
-        <p:cTn id="1" dur="indefinite" nodeType="tmRoot">
+        <p:cTn id="1" dur="indefinite" restart="never" nodeType="tmRoot">
           <p:childTnLst>
             <p:seq concurrent="1" nextAc="seek">
               <p:cTn id="2" dur="0" nodeType="mainSeq"/>
@@ -26137,7 +26225,7 @@
   <p:timing>
     <p:tnLst>
       <p:par>
-        <p:cTn id="1" dur="indefinite" nodeType="tmRoot">
+        <p:cTn id="1" dur="indefinite" restart="never" nodeType="tmRoot">
           <p:childTnLst>
             <p:seq concurrent="1" nextAc="seek">
               <p:cTn id="2" dur="0" nodeType="mainSeq"/>
@@ -26737,7 +26825,7 @@
   <p:timing>
     <p:tnLst>
       <p:par>
-        <p:cTn id="1" dur="indefinite" nodeType="tmRoot">
+        <p:cTn id="1" dur="indefinite" restart="never" nodeType="tmRoot">
           <p:childTnLst>
             <p:seq concurrent="1" nextAc="seek">
               <p:cTn id="2" dur="0" nodeType="mainSeq"/>
@@ -27248,7 +27336,7 @@
   <p:timing>
     <p:tnLst>
       <p:par>
-        <p:cTn id="1" dur="indefinite" nodeType="tmRoot">
+        <p:cTn id="1" dur="indefinite" restart="never" nodeType="tmRoot">
           <p:childTnLst>
             <p:seq concurrent="1" nextAc="seek">
               <p:cTn id="2" dur="0" nodeType="mainSeq"/>
@@ -27662,11 +27750,26 @@
               <a:buChar char="•"/>
             </a:pPr>
             <a:r>
-              <a:rPr lang="fr-FR" altLang="fr-FR" sz="3200">
+              <a:rPr lang="fr-FR" altLang="fr-FR" sz="3200" dirty="0" err="1">
                 <a:latin typeface="Calibri" charset="0"/>
               </a:rPr>
-              <a:t>Map-Filter-Reduce operations</a:t>
-            </a:r>
+              <a:t>Map-Filter-Reduce</a:t>
+            </a:r>
+            <a:r>
+              <a:rPr lang="fr-FR" altLang="fr-FR" sz="3200" dirty="0">
+                <a:latin typeface="Calibri" charset="0"/>
+              </a:rPr>
+              <a:t> </a:t>
+            </a:r>
+            <a:r>
+              <a:rPr lang="fr-FR" altLang="fr-FR" sz="3200" dirty="0" err="1">
+                <a:latin typeface="Calibri" charset="0"/>
+              </a:rPr>
+              <a:t>operations</a:t>
+            </a:r>
+            <a:endParaRPr lang="fr-FR" altLang="fr-FR" sz="3200" dirty="0">
+              <a:latin typeface="Calibri" charset="0"/>
+            </a:endParaRPr>
           </a:p>
           <a:p>
             <a:pPr hangingPunct="1">
@@ -27684,10 +27787,22 @@
               <a:buChar char="•"/>
             </a:pPr>
             <a:r>
+              <a:rPr lang="fr-FR" altLang="fr-FR" sz="3200" dirty="0" err="1">
+                <a:latin typeface="Calibri" charset="0"/>
+              </a:rPr>
+              <a:t>Creating</a:t>
+            </a:r>
+            <a:r>
+              <a:rPr lang="fr-FR" altLang="fr-FR" sz="3200" dirty="0">
+                <a:latin typeface="Calibri" charset="0"/>
+              </a:rPr>
+              <a:t> </a:t>
+            </a:r>
+            <a:r>
               <a:rPr lang="fr-FR" altLang="fr-FR" sz="3200">
                 <a:latin typeface="Calibri" charset="0"/>
               </a:rPr>
-              <a:t>Creating Streams</a:t>
+              <a:t>Streams</a:t>
             </a:r>
           </a:p>
           <a:p>
@@ -27706,9 +27821,53 @@
               <a:buFontTx/>
               <a:buNone/>
             </a:pPr>
-            <a:endParaRPr lang="fr-FR" altLang="fr-FR" sz="3200">
+            <a:endParaRPr lang="fr-FR" altLang="fr-FR" sz="3200" dirty="0">
               <a:latin typeface="Calibri" charset="0"/>
             </a:endParaRPr>
+          </a:p>
+        </p:txBody>
+      </p:sp>
+      <p:sp>
+        <p:nvSpPr>
+          <p:cNvPr id="4" name="Ellipse 3"/>
+          <p:cNvSpPr/>
+          <p:nvPr/>
+        </p:nvSpPr>
+        <p:spPr>
+          <a:xfrm>
+            <a:off x="8028384" y="1268760"/>
+            <a:ext cx="504056" cy="504056"/>
+          </a:xfrm>
+          <a:prstGeom prst="ellipse">
+            <a:avLst/>
+          </a:prstGeom>
+        </p:spPr>
+        <p:style>
+          <a:lnRef idx="2">
+            <a:schemeClr val="accent5">
+              <a:shade val="50000"/>
+            </a:schemeClr>
+          </a:lnRef>
+          <a:fillRef idx="1">
+            <a:schemeClr val="accent5"/>
+          </a:fillRef>
+          <a:effectRef idx="0">
+            <a:schemeClr val="accent5"/>
+          </a:effectRef>
+          <a:fontRef idx="minor">
+            <a:schemeClr val="lt1"/>
+          </a:fontRef>
+        </p:style>
+        <p:txBody>
+          <a:bodyPr rtlCol="0" anchor="ctr"/>
+          <a:lstStyle/>
+          <a:p>
+            <a:pPr algn="ctr"/>
+            <a:r>
+              <a:rPr lang="fr-BE" sz="2800" b="1" dirty="0" smtClean="0"/>
+              <a:t>3</a:t>
+            </a:r>
+            <a:endParaRPr lang="fr-BE" sz="2800" b="1" dirty="0"/>
           </a:p>
         </p:txBody>
       </p:sp>
@@ -27726,7 +27885,7 @@
   <p:timing>
     <p:tnLst>
       <p:par>
-        <p:cTn id="1" dur="indefinite" nodeType="tmRoot">
+        <p:cTn id="1" dur="indefinite" restart="never" nodeType="tmRoot">
           <p:childTnLst>
             <p:seq concurrent="1" nextAc="seek">
               <p:cTn id="2" dur="0" nodeType="mainSeq"/>
@@ -29027,7 +29186,7 @@
   <p:timing>
     <p:tnLst>
       <p:par>
-        <p:cTn id="1" dur="indefinite" nodeType="tmRoot">
+        <p:cTn id="1" dur="indefinite" restart="never" nodeType="tmRoot">
           <p:childTnLst>
             <p:seq concurrent="1" nextAc="seek">
               <p:cTn id="2" dur="0" nodeType="mainSeq"/>
@@ -33296,7 +33455,7 @@
   <p:timing>
     <p:tnLst>
       <p:par>
-        <p:cTn id="1" dur="indefinite" nodeType="tmRoot">
+        <p:cTn id="1" dur="indefinite" restart="never" nodeType="tmRoot">
           <p:childTnLst>
             <p:seq concurrent="1" nextAc="seek">
               <p:cTn id="2" dur="0" nodeType="mainSeq"/>
@@ -34947,7 +35106,7 @@
   <p:timing>
     <p:tnLst>
       <p:par>
-        <p:cTn id="1" dur="indefinite" nodeType="tmRoot">
+        <p:cTn id="1" dur="indefinite" restart="never" nodeType="tmRoot">
           <p:childTnLst>
             <p:seq concurrent="1" nextAc="seek">
               <p:cTn id="2" dur="0" nodeType="mainSeq"/>
@@ -38391,7 +38550,7 @@
   <p:timing>
     <p:tnLst>
       <p:par>
-        <p:cTn id="1" dur="indefinite" nodeType="tmRoot">
+        <p:cTn id="1" dur="indefinite" restart="never" nodeType="tmRoot">
           <p:childTnLst>
             <p:seq concurrent="1" nextAc="seek">
               <p:cTn id="2" dur="0" nodeType="mainSeq"/>
@@ -40378,7 +40537,7 @@
   <p:timing>
     <p:tnLst>
       <p:par>
-        <p:cTn id="1" dur="indefinite" nodeType="tmRoot">
+        <p:cTn id="1" dur="indefinite" restart="never" nodeType="tmRoot">
           <p:childTnLst>
             <p:seq concurrent="1" nextAc="seek">
               <p:cTn id="2" dur="0" nodeType="mainSeq"/>
@@ -40990,7 +41149,7 @@
   <p:timing>
     <p:tnLst>
       <p:par>
-        <p:cTn id="1" dur="indefinite" nodeType="tmRoot">
+        <p:cTn id="1" dur="indefinite" restart="never" nodeType="tmRoot">
           <p:childTnLst>
             <p:seq concurrent="1" nextAc="seek">
               <p:cTn id="2" dur="0" nodeType="mainSeq"/>
@@ -41674,7 +41833,7 @@
   <p:timing>
     <p:tnLst>
       <p:par>
-        <p:cTn id="1" dur="indefinite" nodeType="tmRoot">
+        <p:cTn id="1" dur="indefinite" restart="never" nodeType="tmRoot">
           <p:childTnLst>
             <p:seq concurrent="1" nextAc="seek">
               <p:cTn id="2" dur="0" nodeType="mainSeq"/>
@@ -42170,7 +42329,7 @@
   <p:timing>
     <p:tnLst>
       <p:par>
-        <p:cTn id="1" dur="indefinite" nodeType="tmRoot">
+        <p:cTn id="1" dur="indefinite" restart="never" nodeType="tmRoot">
           <p:childTnLst>
             <p:seq concurrent="1" nextAc="seek">
               <p:cTn id="2" dur="0" nodeType="mainSeq"/>
@@ -42230,8 +42389,8 @@
           <a:lstStyle/>
           <a:p>
             <a:r>
-              <a:rPr lang="fr-BE" dirty="0" smtClean="0"/>
-              <a:t>Reference</a:t>
+              <a:rPr lang="fr-BE" dirty="0" err="1" smtClean="0"/>
+              <a:t>References</a:t>
             </a:r>
             <a:endParaRPr lang="fr-BE" dirty="0"/>
           </a:p>
@@ -42247,9 +42406,16 @@
             <p:ph idx="1"/>
           </p:nvPr>
         </p:nvSpPr>
-        <p:spPr/>
+        <p:spPr>
+          <a:xfrm>
+            <a:off x="457200" y="1340768"/>
+            <a:ext cx="8229600" cy="4785395"/>
+          </a:xfrm>
+        </p:spPr>
         <p:txBody>
-          <a:bodyPr/>
+          <a:bodyPr>
+            <a:normAutofit/>
+          </a:bodyPr>
           <a:lstStyle/>
           <a:p>
             <a:r>
@@ -42265,90 +42431,75 @@
           <a:p>
             <a:pPr lvl="1"/>
             <a:r>
-              <a:rPr lang="fr-BE" dirty="0" smtClean="0"/>
+              <a:rPr lang="fr-BE" sz="1800" dirty="0" smtClean="0"/>
               <a:t>State of the Lambda</a:t>
             </a:r>
             <a:br>
-              <a:rPr lang="fr-BE" dirty="0" smtClean="0"/>
+              <a:rPr lang="fr-BE" sz="1800" dirty="0" smtClean="0"/>
             </a:br>
             <a:r>
-              <a:rPr lang="fr-BE" dirty="0" smtClean="0">
+              <a:rPr lang="fr-BE" sz="1800" dirty="0" smtClean="0">
                 <a:hlinkClick r:id="rId2"/>
               </a:rPr>
               <a:t>http</a:t>
             </a:r>
             <a:r>
-              <a:rPr lang="fr-BE" dirty="0">
+              <a:rPr lang="fr-BE" sz="1800" dirty="0">
                 <a:hlinkClick r:id="rId2"/>
               </a:rPr>
               <a:t>://cr.openjdk.java.net/~</a:t>
             </a:r>
             <a:r>
-              <a:rPr lang="fr-BE" dirty="0" smtClean="0">
+              <a:rPr lang="fr-BE" sz="1800" dirty="0" smtClean="0">
                 <a:hlinkClick r:id="rId2"/>
               </a:rPr>
-              <a:t>briangoetz/lambda/</a:t>
+              <a:t>briangoetz/lambda/lambda-state-final.html</a:t>
+            </a:r>
+            <a:endParaRPr lang="fr-BE" sz="1800" dirty="0" smtClean="0"/>
+          </a:p>
+          <a:p>
+            <a:pPr lvl="1"/>
+            <a:r>
+              <a:rPr lang="fr-BE" sz="1800" dirty="0" smtClean="0"/>
+              <a:t>State of the Lambda: </a:t>
+            </a:r>
+            <a:r>
+              <a:rPr lang="fr-BE" sz="1800" dirty="0" err="1" smtClean="0"/>
+              <a:t>Libraries</a:t>
+            </a:r>
+            <a:r>
+              <a:rPr lang="fr-BE" sz="1800" dirty="0" smtClean="0"/>
+              <a:t> Edition</a:t>
             </a:r>
             <a:br>
-              <a:rPr lang="fr-BE" dirty="0" smtClean="0">
-                <a:hlinkClick r:id="rId2"/>
-              </a:rPr>
+              <a:rPr lang="fr-BE" sz="1800" dirty="0" smtClean="0"/>
             </a:br>
             <a:r>
-              <a:rPr lang="fr-BE" dirty="0" smtClean="0">
-                <a:hlinkClick r:id="rId2"/>
-              </a:rPr>
-              <a:t>lambda-state-final.html</a:t>
-            </a:r>
-            <a:endParaRPr lang="fr-BE" dirty="0" smtClean="0"/>
-          </a:p>
-          <a:p>
-            <a:pPr lvl="1"/>
-            <a:r>
-              <a:rPr lang="fr-BE" dirty="0" smtClean="0"/>
-              <a:t>State of the Lambda: </a:t>
-            </a:r>
-            <a:r>
-              <a:rPr lang="fr-BE" dirty="0" err="1" smtClean="0"/>
-              <a:t>Libraries</a:t>
-            </a:r>
-            <a:r>
-              <a:rPr lang="fr-BE" dirty="0" smtClean="0"/>
-              <a:t> Edition</a:t>
+              <a:rPr lang="fr-BE" sz="1800" dirty="0" smtClean="0">
+                <a:hlinkClick r:id="rId3"/>
+              </a:rPr>
+              <a:t>http</a:t>
+            </a:r>
+            <a:r>
+              <a:rPr lang="fr-BE" sz="1800" dirty="0">
+                <a:hlinkClick r:id="rId3"/>
+              </a:rPr>
+              <a:t>://cr.openjdk.java.net/~</a:t>
+            </a:r>
+            <a:r>
+              <a:rPr lang="fr-BE" sz="1800" dirty="0" smtClean="0">
+                <a:hlinkClick r:id="rId3"/>
+              </a:rPr>
+              <a:t>briangoetz/lambda/lambda-libraries-final.html</a:t>
+            </a:r>
+            <a:r>
+              <a:rPr lang="fr-BE" sz="1800" dirty="0" smtClean="0"/>
+              <a:t/>
             </a:r>
             <a:br>
-              <a:rPr lang="fr-BE" dirty="0" smtClean="0"/>
+              <a:rPr lang="fr-BE" sz="1800" dirty="0" smtClean="0"/>
             </a:br>
-            <a:r>
-              <a:rPr lang="fr-BE" dirty="0" smtClean="0">
-                <a:hlinkClick r:id="rId3"/>
-              </a:rPr>
-              <a:t>http</a:t>
-            </a:r>
-            <a:r>
-              <a:rPr lang="fr-BE" dirty="0">
-                <a:hlinkClick r:id="rId3"/>
-              </a:rPr>
-              <a:t>://cr.openjdk.java.net/~briangoetz/lambda</a:t>
-            </a:r>
-            <a:r>
-              <a:rPr lang="fr-BE" dirty="0" smtClean="0">
-                <a:hlinkClick r:id="rId3"/>
-              </a:rPr>
-              <a:t>/</a:t>
-            </a:r>
-            <a:br>
-              <a:rPr lang="fr-BE" dirty="0" smtClean="0">
-                <a:hlinkClick r:id="rId3"/>
-              </a:rPr>
-            </a:br>
-            <a:r>
-              <a:rPr lang="fr-BE" dirty="0" smtClean="0">
-                <a:hlinkClick r:id="rId3"/>
-              </a:rPr>
-              <a:t>lambda-libraries-final.html</a:t>
-            </a:r>
-            <a:endParaRPr lang="fr-BE" dirty="0" smtClean="0"/>
+            <a:endParaRPr lang="fr-BE" sz="1800" dirty="0" smtClean="0"/>
           </a:p>
           <a:p>
             <a:r>
@@ -42364,18 +42515,45 @@
           <a:p>
             <a:pPr lvl="1"/>
             <a:r>
-              <a:rPr lang="fr-BE" dirty="0">
+              <a:rPr lang="fr-BE" sz="1800" dirty="0">
                 <a:hlinkClick r:id="rId4"/>
               </a:rPr>
               <a:t>http://</a:t>
             </a:r>
             <a:r>
-              <a:rPr lang="fr-BE" dirty="0" smtClean="0">
+              <a:rPr lang="fr-BE" sz="1800" dirty="0" smtClean="0">
                 <a:hlinkClick r:id="rId4"/>
               </a:rPr>
               <a:t>www.slideshare.net/jpaumard</a:t>
             </a:r>
-            <a:endParaRPr lang="fr-BE" dirty="0" smtClean="0"/>
+            <a:r>
+              <a:rPr lang="fr-BE" sz="1800" dirty="0" smtClean="0"/>
+              <a:t/>
+            </a:r>
+            <a:br>
+              <a:rPr lang="fr-BE" sz="1800" dirty="0" smtClean="0"/>
+            </a:br>
+            <a:endParaRPr lang="fr-BE" sz="1800" dirty="0" smtClean="0"/>
+          </a:p>
+          <a:p>
+            <a:r>
+              <a:rPr lang="fr-BE" dirty="0" err="1" smtClean="0"/>
+              <a:t>Angelika</a:t>
+            </a:r>
+            <a:r>
+              <a:rPr lang="fr-BE" dirty="0" smtClean="0"/>
+              <a:t> Langer</a:t>
+            </a:r>
+          </a:p>
+          <a:p>
+            <a:pPr lvl="1"/>
+            <a:r>
+              <a:rPr lang="fr-BE" sz="1800" dirty="0">
+                <a:hlinkClick r:id="rId5"/>
+              </a:rPr>
+              <a:t>http://www.angelikalanger.com/Lambdas/Lambdas.html</a:t>
+            </a:r>
+            <a:endParaRPr lang="fr-BE" sz="1800" dirty="0" smtClean="0"/>
           </a:p>
           <a:p>
             <a:pPr lvl="1"/>

</xml_diff>